<commit_message>
Se agrego contenido hasta el capitulo IV en la presentacion
</commit_message>
<xml_diff>
--- a/Tesis.pptx
+++ b/Tesis.pptx
@@ -27,7 +27,10 @@
     <p:sldId id="278" r:id="rId21"/>
     <p:sldId id="272" r:id="rId22"/>
     <p:sldId id="273" r:id="rId23"/>
-    <p:sldId id="274" r:id="rId24"/>
+    <p:sldId id="279" r:id="rId24"/>
+    <p:sldId id="280" r:id="rId25"/>
+    <p:sldId id="281" r:id="rId26"/>
+    <p:sldId id="274" r:id="rId27"/>
   </p:sldIdLst>
   <p:sldSz cx="12192000" cy="6858000"/>
   <p:notesSz cx="6858000" cy="9144000"/>
@@ -128,7 +131,7 @@
   </p:defaultTextStyle>
   <p:extLst>
     <p:ext uri="{EFAFB233-063F-42B5-8137-9DF3F51BA10A}">
-      <p15:sldGuideLst xmlns:p15="http://schemas.microsoft.com/office/powerpoint/2012/main"/>
+      <p15:sldGuideLst xmlns:p15="http://schemas.microsoft.com/office/powerpoint/2012/main" xmlns=""/>
     </p:ext>
   </p:extLst>
 </p:presentation>
@@ -317,7 +320,7 @@
           <a:p>
             <a:fld id="{4AAD347D-5ACD-4C99-B74B-A9C85AD731AF}" type="datetimeFigureOut">
               <a:rPr lang="en-US" dirty="0"/>
-              <a:t>7/15/2015</a:t>
+              <a:t>7/16/2015</a:t>
             </a:fld>
             <a:endParaRPr lang="en-US" dirty="0"/>
           </a:p>
@@ -587,7 +590,7 @@
           <a:p>
             <a:fld id="{4509A250-FF31-4206-8172-F9D3106AACB1}" type="datetimeFigureOut">
               <a:rPr lang="en-US" dirty="0"/>
-              <a:t>7/15/2015</a:t>
+              <a:t>7/16/2015</a:t>
             </a:fld>
             <a:endParaRPr lang="en-US" dirty="0"/>
           </a:p>
@@ -776,7 +779,7 @@
           <a:p>
             <a:fld id="{4509A250-FF31-4206-8172-F9D3106AACB1}" type="datetimeFigureOut">
               <a:rPr lang="en-US" dirty="0"/>
-              <a:t>7/15/2015</a:t>
+              <a:t>7/16/2015</a:t>
             </a:fld>
             <a:endParaRPr lang="en-US" dirty="0"/>
           </a:p>
@@ -1039,7 +1042,7 @@
           <a:p>
             <a:fld id="{4509A250-FF31-4206-8172-F9D3106AACB1}" type="datetimeFigureOut">
               <a:rPr lang="en-US" dirty="0"/>
-              <a:t>7/15/2015</a:t>
+              <a:t>7/16/2015</a:t>
             </a:fld>
             <a:endParaRPr lang="en-US" dirty="0"/>
           </a:p>
@@ -1366,7 +1369,7 @@
           <a:p>
             <a:fld id="{4509A250-FF31-4206-8172-F9D3106AACB1}" type="datetimeFigureOut">
               <a:rPr lang="en-US" dirty="0"/>
-              <a:t>7/15/2015</a:t>
+              <a:t>7/16/2015</a:t>
             </a:fld>
             <a:endParaRPr lang="en-US" dirty="0"/>
           </a:p>
@@ -1971,7 +1974,7 @@
           <a:p>
             <a:fld id="{4509A250-FF31-4206-8172-F9D3106AACB1}" type="datetimeFigureOut">
               <a:rPr lang="en-US" dirty="0"/>
-              <a:t>7/15/2015</a:t>
+              <a:t>7/16/2015</a:t>
             </a:fld>
             <a:endParaRPr lang="en-US" dirty="0"/>
           </a:p>
@@ -2813,7 +2816,7 @@
           <a:p>
             <a:fld id="{4509A250-FF31-4206-8172-F9D3106AACB1}" type="datetimeFigureOut">
               <a:rPr lang="en-US" dirty="0"/>
-              <a:t>7/15/2015</a:t>
+              <a:t>7/16/2015</a:t>
             </a:fld>
             <a:endParaRPr lang="en-US" dirty="0"/>
           </a:p>
@@ -2978,7 +2981,7 @@
           <a:p>
             <a:fld id="{4509A250-FF31-4206-8172-F9D3106AACB1}" type="datetimeFigureOut">
               <a:rPr lang="en-US" dirty="0"/>
-              <a:t>7/15/2015</a:t>
+              <a:t>7/16/2015</a:t>
             </a:fld>
             <a:endParaRPr lang="en-US" dirty="0"/>
           </a:p>
@@ -3153,7 +3156,7 @@
           <a:p>
             <a:fld id="{4509A250-FF31-4206-8172-F9D3106AACB1}" type="datetimeFigureOut">
               <a:rPr lang="en-US" dirty="0"/>
-              <a:t>7/15/2015</a:t>
+              <a:t>7/16/2015</a:t>
             </a:fld>
             <a:endParaRPr lang="en-US" dirty="0"/>
           </a:p>
@@ -3318,7 +3321,7 @@
           <a:p>
             <a:fld id="{4509A250-FF31-4206-8172-F9D3106AACB1}" type="datetimeFigureOut">
               <a:rPr lang="en-US" dirty="0"/>
-              <a:t>7/15/2015</a:t>
+              <a:t>7/16/2015</a:t>
             </a:fld>
             <a:endParaRPr lang="en-US" dirty="0"/>
           </a:p>
@@ -3557,7 +3560,7 @@
           <a:p>
             <a:fld id="{4509A250-FF31-4206-8172-F9D3106AACB1}" type="datetimeFigureOut">
               <a:rPr lang="en-US" dirty="0"/>
-              <a:t>7/15/2015</a:t>
+              <a:t>7/16/2015</a:t>
             </a:fld>
             <a:endParaRPr lang="en-US" dirty="0"/>
           </a:p>
@@ -3844,7 +3847,7 @@
           <a:p>
             <a:fld id="{4509A250-FF31-4206-8172-F9D3106AACB1}" type="datetimeFigureOut">
               <a:rPr lang="en-US" dirty="0"/>
-              <a:t>7/15/2015</a:t>
+              <a:t>7/16/2015</a:t>
             </a:fld>
             <a:endParaRPr lang="en-US" dirty="0"/>
           </a:p>
@@ -4277,7 +4280,7 @@
           <a:p>
             <a:fld id="{4509A250-FF31-4206-8172-F9D3106AACB1}" type="datetimeFigureOut">
               <a:rPr lang="en-US" dirty="0"/>
-              <a:t>7/15/2015</a:t>
+              <a:t>7/16/2015</a:t>
             </a:fld>
             <a:endParaRPr lang="en-US" dirty="0"/>
           </a:p>
@@ -4390,7 +4393,7 @@
           <a:p>
             <a:fld id="{4509A250-FF31-4206-8172-F9D3106AACB1}" type="datetimeFigureOut">
               <a:rPr lang="en-US" dirty="0"/>
-              <a:t>7/15/2015</a:t>
+              <a:t>7/16/2015</a:t>
             </a:fld>
             <a:endParaRPr lang="en-US" dirty="0"/>
           </a:p>
@@ -4480,7 +4483,7 @@
           <a:p>
             <a:fld id="{4509A250-FF31-4206-8172-F9D3106AACB1}" type="datetimeFigureOut">
               <a:rPr lang="en-US" dirty="0"/>
-              <a:t>7/15/2015</a:t>
+              <a:t>7/16/2015</a:t>
             </a:fld>
             <a:endParaRPr lang="en-US" dirty="0"/>
           </a:p>
@@ -4754,7 +4757,7 @@
           <a:p>
             <a:fld id="{4509A250-FF31-4206-8172-F9D3106AACB1}" type="datetimeFigureOut">
               <a:rPr lang="en-US" dirty="0"/>
-              <a:t>7/15/2015</a:t>
+              <a:t>7/16/2015</a:t>
             </a:fld>
             <a:endParaRPr lang="en-US" dirty="0"/>
           </a:p>
@@ -5024,7 +5027,7 @@
           <a:p>
             <a:fld id="{4509A250-FF31-4206-8172-F9D3106AACB1}" type="datetimeFigureOut">
               <a:rPr lang="en-US" dirty="0"/>
-              <a:t>7/15/2015</a:t>
+              <a:t>7/16/2015</a:t>
             </a:fld>
             <a:endParaRPr lang="en-US" dirty="0"/>
           </a:p>
@@ -5448,7 +5451,7 @@
           <a:p>
             <a:fld id="{4509A250-FF31-4206-8172-F9D3106AACB1}" type="datetimeFigureOut">
               <a:rPr lang="en-US" dirty="0"/>
-              <a:t>7/15/2015</a:t>
+              <a:t>7/16/2015</a:t>
             </a:fld>
             <a:endParaRPr lang="en-US" dirty="0"/>
           </a:p>
@@ -6020,19 +6023,7 @@
           <a:p>
             <a:r>
               <a:rPr lang="es-PE" dirty="0" smtClean="0"/>
-              <a:t>Fecha: </a:t>
-            </a:r>
-            <a:r>
-              <a:rPr lang="es-PE" dirty="0" smtClean="0"/>
-              <a:t>17 </a:t>
-            </a:r>
-            <a:r>
-              <a:rPr lang="es-PE" dirty="0" smtClean="0"/>
-              <a:t>de </a:t>
-            </a:r>
-            <a:r>
-              <a:rPr lang="es-PE" dirty="0" smtClean="0"/>
-              <a:t>JULIO </a:t>
+              <a:t>Fecha: 17 de JULIO </a:t>
             </a:r>
             <a:r>
               <a:rPr lang="es-PE" smtClean="0"/>
@@ -9424,6 +9415,7 @@
               <a:rPr lang="es-PE" sz="3600" b="1" dirty="0" smtClean="0"/>
               <a:t>III</a:t>
             </a:r>
+            <a:endParaRPr lang="es-PE" sz="3600" b="1" dirty="0" smtClean="0"/>
           </a:p>
           <a:p>
             <a:pPr algn="ctr"/>
@@ -9563,27 +9555,45 @@
             </a:r>
           </a:p>
           <a:p>
-            <a:pPr marL="0" indent="0">
-              <a:buNone/>
-            </a:pPr>
-            <a:endParaRPr lang="es-PE" sz="3200" dirty="0" smtClean="0"/>
-          </a:p>
-          <a:p>
             <a:r>
               <a:rPr lang="es-PE" sz="3200" dirty="0" smtClean="0"/>
-              <a:t>Capítulo II: Marco Teórico</a:t>
-            </a:r>
-          </a:p>
-          <a:p>
-            <a:pPr marL="0" indent="0">
-              <a:buNone/>
-            </a:pPr>
-            <a:endParaRPr lang="es-PE" sz="3200" dirty="0" smtClean="0"/>
-          </a:p>
-          <a:p>
+              <a:t>Capítulo </a:t>
+            </a:r>
             <a:r>
               <a:rPr lang="es-PE" sz="3200" dirty="0" smtClean="0"/>
-              <a:t>Capítulo III: Estado del Arte</a:t>
+              <a:t>II: Marco Teórico</a:t>
+            </a:r>
+          </a:p>
+          <a:p>
+            <a:r>
+              <a:rPr lang="es-PE" sz="3200" dirty="0" smtClean="0"/>
+              <a:t>Capítulo </a:t>
+            </a:r>
+            <a:r>
+              <a:rPr lang="es-PE" sz="3200" dirty="0" smtClean="0"/>
+              <a:t>III: Estado del </a:t>
+            </a:r>
+            <a:r>
+              <a:rPr lang="es-PE" sz="3200" dirty="0" smtClean="0"/>
+              <a:t>Arte</a:t>
+            </a:r>
+          </a:p>
+          <a:p>
+            <a:r>
+              <a:rPr lang="es-PE" sz="3200" dirty="0" smtClean="0"/>
+              <a:t>Capítulo IV: Aporte Teórico</a:t>
+            </a:r>
+          </a:p>
+          <a:p>
+            <a:r>
+              <a:rPr lang="es-PE" sz="3200" dirty="0" smtClean="0"/>
+              <a:t>Capítulo V: Aporte Práctico</a:t>
+            </a:r>
+          </a:p>
+          <a:p>
+            <a:r>
+              <a:rPr lang="es-PE" sz="3200" dirty="0" smtClean="0"/>
+              <a:t>Capítulo VI: Conclusiones y Recomendaciones</a:t>
             </a:r>
             <a:endParaRPr lang="es-PE" sz="3200" dirty="0"/>
           </a:p>
@@ -10956,7 +10966,7 @@
             <p:ph idx="1"/>
             <p:extLst>
               <p:ext uri="{D42A27DB-BD31-4B8C-83A1-F6EECF244321}">
-                <p14:modId xmlns:p14="http://schemas.microsoft.com/office/powerpoint/2010/main" val="553762397"/>
+                <p14:modId xmlns:p14="http://schemas.microsoft.com/office/powerpoint/2010/main" val="2974470887"/>
               </p:ext>
             </p:extLst>
           </p:nvPr>
@@ -11686,10 +11696,18 @@
                     <a:p>
                       <a:pPr algn="ctr"/>
                       <a:r>
-                        <a:rPr lang="es-PE" b="1" dirty="0" smtClean="0"/>
+                        <a:rPr lang="es-PE" b="1" dirty="0" smtClean="0">
+                          <a:solidFill>
+                            <a:srgbClr val="C00000"/>
+                          </a:solidFill>
+                        </a:rPr>
                         <a:t>54</a:t>
                       </a:r>
-                      <a:endParaRPr lang="es-PE" b="1" dirty="0"/>
+                      <a:endParaRPr lang="es-PE" b="1" dirty="0">
+                        <a:solidFill>
+                          <a:srgbClr val="C00000"/>
+                        </a:solidFill>
+                      </a:endParaRPr>
                     </a:p>
                   </a:txBody>
                   <a:tcPr/>
@@ -11785,6 +11803,1356 @@
       </p:grpSpPr>
       <p:sp>
         <p:nvSpPr>
+          <p:cNvPr id="3" name="Marcador de contenido 2"/>
+          <p:cNvSpPr>
+            <a:spLocks noGrp="1"/>
+          </p:cNvSpPr>
+          <p:nvPr>
+            <p:ph idx="1"/>
+          </p:nvPr>
+        </p:nvSpPr>
+        <p:spPr/>
+        <p:txBody>
+          <a:bodyPr>
+            <a:normAutofit/>
+          </a:bodyPr>
+          <a:lstStyle/>
+          <a:p>
+            <a:r>
+              <a:rPr lang="es-PE" sz="2200" dirty="0" smtClean="0"/>
+              <a:t>Jeff </a:t>
+            </a:r>
+            <a:r>
+              <a:rPr lang="es-PE" sz="2400" dirty="0" smtClean="0"/>
+              <a:t>Sutherland, vicepresidente de ingeniería en </a:t>
+            </a:r>
+            <a:r>
+              <a:rPr lang="es-PE" sz="2400" dirty="0" err="1" smtClean="0"/>
+              <a:t>Eissel</a:t>
+            </a:r>
+            <a:r>
+              <a:rPr lang="es-PE" sz="2400" dirty="0" smtClean="0"/>
+              <a:t> Inc., quería mejorar RAD.</a:t>
+            </a:r>
+          </a:p>
+          <a:p>
+            <a:r>
+              <a:rPr lang="es-PE" sz="2400" dirty="0"/>
+              <a:t>Ken </a:t>
+            </a:r>
+            <a:r>
+              <a:rPr lang="es-PE" sz="2400" dirty="0" err="1" smtClean="0"/>
+              <a:t>Schwaber</a:t>
+            </a:r>
+            <a:r>
+              <a:rPr lang="es-PE" sz="2400" dirty="0" smtClean="0"/>
+              <a:t>, dueño de </a:t>
+            </a:r>
+            <a:r>
+              <a:rPr lang="es-PE" sz="2400" dirty="0" err="1" smtClean="0"/>
+              <a:t>Advanced</a:t>
+            </a:r>
+            <a:r>
+              <a:rPr lang="es-PE" sz="2400" dirty="0" smtClean="0"/>
+              <a:t> </a:t>
+            </a:r>
+            <a:r>
+              <a:rPr lang="es-PE" sz="2400" dirty="0" err="1" smtClean="0"/>
+              <a:t>Development</a:t>
+            </a:r>
+            <a:r>
+              <a:rPr lang="es-PE" sz="2400" dirty="0" smtClean="0"/>
+              <a:t> </a:t>
+            </a:r>
+            <a:r>
+              <a:rPr lang="es-PE" sz="2400" dirty="0" err="1" smtClean="0"/>
+              <a:t>Methods</a:t>
+            </a:r>
+            <a:r>
+              <a:rPr lang="es-PE" sz="2400" dirty="0" smtClean="0"/>
+              <a:t>, buscaba mejorar la productividad y procesos en el desarrollo de software.</a:t>
+            </a:r>
+            <a:endParaRPr lang="es-PE" sz="2200" dirty="0" smtClean="0"/>
+          </a:p>
+          <a:p>
+            <a:r>
+              <a:rPr lang="es-PE" sz="2200" dirty="0" err="1" smtClean="0"/>
+              <a:t>Scrum</a:t>
+            </a:r>
+            <a:r>
+              <a:rPr lang="es-PE" sz="2200" dirty="0" smtClean="0"/>
+              <a:t> nace com</a:t>
+            </a:r>
+            <a:r>
+              <a:rPr lang="es-PE" sz="2200" dirty="0" smtClean="0"/>
+              <a:t>o evolución de ambos intentos para lograr una metodología que permita un desarrollo ágil, en la que el cliente tenga mayor participación y el equipo sea multidisciplinario.</a:t>
+            </a:r>
+          </a:p>
+        </p:txBody>
+      </p:sp>
+      <p:sp>
+        <p:nvSpPr>
+          <p:cNvPr id="5" name="Título 1"/>
+          <p:cNvSpPr txBox="1">
+            <a:spLocks/>
+          </p:cNvSpPr>
+          <p:nvPr/>
+        </p:nvSpPr>
+        <p:spPr>
+          <a:xfrm>
+            <a:off x="11370260" y="452718"/>
+            <a:ext cx="420687" cy="4809093"/>
+          </a:xfrm>
+          <a:prstGeom prst="rect">
+            <a:avLst/>
+          </a:prstGeom>
+        </p:spPr>
+        <p:txBody>
+          <a:bodyPr vert="horz" lIns="91440" tIns="45720" rIns="91440" bIns="45720" rtlCol="0" anchor="t">
+            <a:noAutofit/>
+          </a:bodyPr>
+          <a:lstStyle>
+            <a:lvl1pPr algn="l" defTabSz="457200" rtl="0" eaLnBrk="1" latinLnBrk="0" hangingPunct="1">
+              <a:spcBef>
+                <a:spcPct val="0"/>
+              </a:spcBef>
+              <a:buNone/>
+              <a:defRPr sz="4200" b="0" i="0" kern="1200">
+                <a:solidFill>
+                  <a:schemeClr val="tx2"/>
+                </a:solidFill>
+                <a:latin typeface="+mj-lt"/>
+                <a:ea typeface="+mj-ea"/>
+                <a:cs typeface="+mj-cs"/>
+              </a:defRPr>
+            </a:lvl1pPr>
+            <a:lvl2pPr eaLnBrk="1" hangingPunct="1">
+              <a:defRPr>
+                <a:solidFill>
+                  <a:schemeClr val="tx2"/>
+                </a:solidFill>
+              </a:defRPr>
+            </a:lvl2pPr>
+            <a:lvl3pPr eaLnBrk="1" hangingPunct="1">
+              <a:defRPr>
+                <a:solidFill>
+                  <a:schemeClr val="tx2"/>
+                </a:solidFill>
+              </a:defRPr>
+            </a:lvl3pPr>
+            <a:lvl4pPr eaLnBrk="1" hangingPunct="1">
+              <a:defRPr>
+                <a:solidFill>
+                  <a:schemeClr val="tx2"/>
+                </a:solidFill>
+              </a:defRPr>
+            </a:lvl4pPr>
+            <a:lvl5pPr eaLnBrk="1" hangingPunct="1">
+              <a:defRPr>
+                <a:solidFill>
+                  <a:schemeClr val="tx2"/>
+                </a:solidFill>
+              </a:defRPr>
+            </a:lvl5pPr>
+            <a:lvl6pPr eaLnBrk="1" hangingPunct="1">
+              <a:defRPr>
+                <a:solidFill>
+                  <a:schemeClr val="tx2"/>
+                </a:solidFill>
+              </a:defRPr>
+            </a:lvl6pPr>
+            <a:lvl7pPr eaLnBrk="1" hangingPunct="1">
+              <a:defRPr>
+                <a:solidFill>
+                  <a:schemeClr val="tx2"/>
+                </a:solidFill>
+              </a:defRPr>
+            </a:lvl7pPr>
+            <a:lvl8pPr eaLnBrk="1" hangingPunct="1">
+              <a:defRPr>
+                <a:solidFill>
+                  <a:schemeClr val="tx2"/>
+                </a:solidFill>
+              </a:defRPr>
+            </a:lvl8pPr>
+            <a:lvl9pPr eaLnBrk="1" hangingPunct="1">
+              <a:defRPr>
+                <a:solidFill>
+                  <a:schemeClr val="tx2"/>
+                </a:solidFill>
+              </a:defRPr>
+            </a:lvl9pPr>
+          </a:lstStyle>
+          <a:p>
+            <a:pPr algn="ctr"/>
+            <a:r>
+              <a:rPr lang="es-PE" sz="3600" b="1" dirty="0" smtClean="0"/>
+              <a:t>CAPÍTULO</a:t>
+            </a:r>
+          </a:p>
+          <a:p>
+            <a:pPr algn="ctr"/>
+            <a:r>
+              <a:rPr lang="es-PE" sz="3600" b="1" dirty="0" smtClean="0"/>
+              <a:t> </a:t>
+            </a:r>
+          </a:p>
+        </p:txBody>
+      </p:sp>
+      <p:sp>
+        <p:nvSpPr>
+          <p:cNvPr id="6" name="Título 1"/>
+          <p:cNvSpPr txBox="1">
+            <a:spLocks/>
+          </p:cNvSpPr>
+          <p:nvPr/>
+        </p:nvSpPr>
+        <p:spPr>
+          <a:xfrm>
+            <a:off x="11231765" y="5261811"/>
+            <a:ext cx="697676" cy="613612"/>
+          </a:xfrm>
+          <a:prstGeom prst="rect">
+            <a:avLst/>
+          </a:prstGeom>
+        </p:spPr>
+        <p:txBody>
+          <a:bodyPr vert="horz" lIns="91440" tIns="45720" rIns="91440" bIns="45720" rtlCol="0" anchor="t">
+            <a:noAutofit/>
+          </a:bodyPr>
+          <a:lstStyle>
+            <a:lvl1pPr algn="l" defTabSz="457200" rtl="0" eaLnBrk="1" latinLnBrk="0" hangingPunct="1">
+              <a:spcBef>
+                <a:spcPct val="0"/>
+              </a:spcBef>
+              <a:buNone/>
+              <a:defRPr sz="4200" b="0" i="0" kern="1200">
+                <a:solidFill>
+                  <a:schemeClr val="tx2"/>
+                </a:solidFill>
+                <a:latin typeface="+mj-lt"/>
+                <a:ea typeface="+mj-ea"/>
+                <a:cs typeface="+mj-cs"/>
+              </a:defRPr>
+            </a:lvl1pPr>
+            <a:lvl2pPr eaLnBrk="1" hangingPunct="1">
+              <a:defRPr>
+                <a:solidFill>
+                  <a:schemeClr val="tx2"/>
+                </a:solidFill>
+              </a:defRPr>
+            </a:lvl2pPr>
+            <a:lvl3pPr eaLnBrk="1" hangingPunct="1">
+              <a:defRPr>
+                <a:solidFill>
+                  <a:schemeClr val="tx2"/>
+                </a:solidFill>
+              </a:defRPr>
+            </a:lvl3pPr>
+            <a:lvl4pPr eaLnBrk="1" hangingPunct="1">
+              <a:defRPr>
+                <a:solidFill>
+                  <a:schemeClr val="tx2"/>
+                </a:solidFill>
+              </a:defRPr>
+            </a:lvl4pPr>
+            <a:lvl5pPr eaLnBrk="1" hangingPunct="1">
+              <a:defRPr>
+                <a:solidFill>
+                  <a:schemeClr val="tx2"/>
+                </a:solidFill>
+              </a:defRPr>
+            </a:lvl5pPr>
+            <a:lvl6pPr eaLnBrk="1" hangingPunct="1">
+              <a:defRPr>
+                <a:solidFill>
+                  <a:schemeClr val="tx2"/>
+                </a:solidFill>
+              </a:defRPr>
+            </a:lvl6pPr>
+            <a:lvl7pPr eaLnBrk="1" hangingPunct="1">
+              <a:defRPr>
+                <a:solidFill>
+                  <a:schemeClr val="tx2"/>
+                </a:solidFill>
+              </a:defRPr>
+            </a:lvl7pPr>
+            <a:lvl8pPr eaLnBrk="1" hangingPunct="1">
+              <a:defRPr>
+                <a:solidFill>
+                  <a:schemeClr val="tx2"/>
+                </a:solidFill>
+              </a:defRPr>
+            </a:lvl8pPr>
+            <a:lvl9pPr eaLnBrk="1" hangingPunct="1">
+              <a:defRPr>
+                <a:solidFill>
+                  <a:schemeClr val="tx2"/>
+                </a:solidFill>
+              </a:defRPr>
+            </a:lvl9pPr>
+          </a:lstStyle>
+          <a:p>
+            <a:pPr algn="ctr"/>
+            <a:r>
+              <a:rPr lang="es-PE" sz="3600" b="1" dirty="0" smtClean="0"/>
+              <a:t>IV</a:t>
+            </a:r>
+            <a:endParaRPr lang="es-PE" sz="3600" b="1" dirty="0" smtClean="0"/>
+          </a:p>
+          <a:p>
+            <a:pPr algn="ctr"/>
+            <a:r>
+              <a:rPr lang="es-PE" sz="3600" b="1" dirty="0" smtClean="0"/>
+              <a:t> </a:t>
+            </a:r>
+          </a:p>
+        </p:txBody>
+      </p:sp>
+      <p:pic>
+        <p:nvPicPr>
+          <p:cNvPr id="7" name="image01.gif"/>
+          <p:cNvPicPr/>
+          <p:nvPr/>
+        </p:nvPicPr>
+        <p:blipFill>
+          <a:blip r:embed="rId2"/>
+          <a:srcRect/>
+          <a:stretch>
+            <a:fillRect/>
+          </a:stretch>
+        </p:blipFill>
+        <p:spPr>
+          <a:xfrm>
+            <a:off x="10307555" y="438651"/>
+            <a:ext cx="1009650" cy="1200150"/>
+          </a:xfrm>
+          <a:prstGeom prst="rect">
+            <a:avLst/>
+          </a:prstGeom>
+          <a:ln/>
+        </p:spPr>
+      </p:pic>
+      <p:sp>
+        <p:nvSpPr>
+          <p:cNvPr id="9" name="Título 1"/>
+          <p:cNvSpPr>
+            <a:spLocks noGrp="1"/>
+          </p:cNvSpPr>
+          <p:nvPr>
+            <p:ph type="title"/>
+          </p:nvPr>
+        </p:nvSpPr>
+        <p:spPr>
+          <a:xfrm>
+            <a:off x="646111" y="452718"/>
+            <a:ext cx="9404723" cy="1400530"/>
+          </a:xfrm>
+        </p:spPr>
+        <p:txBody>
+          <a:bodyPr/>
+          <a:lstStyle/>
+          <a:p>
+            <a:r>
+              <a:rPr lang="es-PE" dirty="0" smtClean="0"/>
+              <a:t>Metodolog</a:t>
+            </a:r>
+            <a:r>
+              <a:rPr lang="es-PE" dirty="0" smtClean="0"/>
+              <a:t>ía</a:t>
+            </a:r>
+            <a:endParaRPr lang="es-PE" dirty="0"/>
+          </a:p>
+        </p:txBody>
+      </p:sp>
+    </p:spTree>
+    <p:extLst>
+      <p:ext uri="{BB962C8B-B14F-4D97-AF65-F5344CB8AC3E}">
+        <p14:creationId xmlns:p14="http://schemas.microsoft.com/office/powerpoint/2010/main" val="319355875"/>
+      </p:ext>
+    </p:extLst>
+  </p:cSld>
+  <p:clrMapOvr>
+    <a:masterClrMapping/>
+  </p:clrMapOvr>
+</p:sld>
+</file>
+
+<file path=ppt/slides/slide24.xml><?xml version="1.0" encoding="utf-8"?>
+<p:sld xmlns:a="http://schemas.openxmlformats.org/drawingml/2006/main" xmlns:r="http://schemas.openxmlformats.org/officeDocument/2006/relationships" xmlns:p="http://schemas.openxmlformats.org/presentationml/2006/main">
+  <p:cSld>
+    <p:spTree>
+      <p:nvGrpSpPr>
+        <p:cNvPr id="1" name=""/>
+        <p:cNvGrpSpPr/>
+        <p:nvPr/>
+      </p:nvGrpSpPr>
+      <p:grpSpPr>
+        <a:xfrm>
+          <a:off x="0" y="0"/>
+          <a:ext cx="0" cy="0"/>
+          <a:chOff x="0" y="0"/>
+          <a:chExt cx="0" cy="0"/>
+        </a:xfrm>
+      </p:grpSpPr>
+      <p:sp>
+        <p:nvSpPr>
+          <p:cNvPr id="5" name="Título 1"/>
+          <p:cNvSpPr txBox="1">
+            <a:spLocks/>
+          </p:cNvSpPr>
+          <p:nvPr/>
+        </p:nvSpPr>
+        <p:spPr>
+          <a:xfrm>
+            <a:off x="11370260" y="452718"/>
+            <a:ext cx="420687" cy="4809093"/>
+          </a:xfrm>
+          <a:prstGeom prst="rect">
+            <a:avLst/>
+          </a:prstGeom>
+        </p:spPr>
+        <p:txBody>
+          <a:bodyPr vert="horz" lIns="91440" tIns="45720" rIns="91440" bIns="45720" rtlCol="0" anchor="t">
+            <a:noAutofit/>
+          </a:bodyPr>
+          <a:lstStyle>
+            <a:lvl1pPr algn="l" defTabSz="457200" rtl="0" eaLnBrk="1" latinLnBrk="0" hangingPunct="1">
+              <a:spcBef>
+                <a:spcPct val="0"/>
+              </a:spcBef>
+              <a:buNone/>
+              <a:defRPr sz="4200" b="0" i="0" kern="1200">
+                <a:solidFill>
+                  <a:schemeClr val="tx2"/>
+                </a:solidFill>
+                <a:latin typeface="+mj-lt"/>
+                <a:ea typeface="+mj-ea"/>
+                <a:cs typeface="+mj-cs"/>
+              </a:defRPr>
+            </a:lvl1pPr>
+            <a:lvl2pPr eaLnBrk="1" hangingPunct="1">
+              <a:defRPr>
+                <a:solidFill>
+                  <a:schemeClr val="tx2"/>
+                </a:solidFill>
+              </a:defRPr>
+            </a:lvl2pPr>
+            <a:lvl3pPr eaLnBrk="1" hangingPunct="1">
+              <a:defRPr>
+                <a:solidFill>
+                  <a:schemeClr val="tx2"/>
+                </a:solidFill>
+              </a:defRPr>
+            </a:lvl3pPr>
+            <a:lvl4pPr eaLnBrk="1" hangingPunct="1">
+              <a:defRPr>
+                <a:solidFill>
+                  <a:schemeClr val="tx2"/>
+                </a:solidFill>
+              </a:defRPr>
+            </a:lvl4pPr>
+            <a:lvl5pPr eaLnBrk="1" hangingPunct="1">
+              <a:defRPr>
+                <a:solidFill>
+                  <a:schemeClr val="tx2"/>
+                </a:solidFill>
+              </a:defRPr>
+            </a:lvl5pPr>
+            <a:lvl6pPr eaLnBrk="1" hangingPunct="1">
+              <a:defRPr>
+                <a:solidFill>
+                  <a:schemeClr val="tx2"/>
+                </a:solidFill>
+              </a:defRPr>
+            </a:lvl6pPr>
+            <a:lvl7pPr eaLnBrk="1" hangingPunct="1">
+              <a:defRPr>
+                <a:solidFill>
+                  <a:schemeClr val="tx2"/>
+                </a:solidFill>
+              </a:defRPr>
+            </a:lvl7pPr>
+            <a:lvl8pPr eaLnBrk="1" hangingPunct="1">
+              <a:defRPr>
+                <a:solidFill>
+                  <a:schemeClr val="tx2"/>
+                </a:solidFill>
+              </a:defRPr>
+            </a:lvl8pPr>
+            <a:lvl9pPr eaLnBrk="1" hangingPunct="1">
+              <a:defRPr>
+                <a:solidFill>
+                  <a:schemeClr val="tx2"/>
+                </a:solidFill>
+              </a:defRPr>
+            </a:lvl9pPr>
+          </a:lstStyle>
+          <a:p>
+            <a:pPr algn="ctr"/>
+            <a:r>
+              <a:rPr lang="es-PE" sz="3600" b="1" dirty="0" smtClean="0"/>
+              <a:t>CAPÍTULO</a:t>
+            </a:r>
+          </a:p>
+          <a:p>
+            <a:pPr algn="ctr"/>
+            <a:r>
+              <a:rPr lang="es-PE" sz="3600" b="1" dirty="0" smtClean="0"/>
+              <a:t> </a:t>
+            </a:r>
+          </a:p>
+        </p:txBody>
+      </p:sp>
+      <p:sp>
+        <p:nvSpPr>
+          <p:cNvPr id="6" name="Título 1"/>
+          <p:cNvSpPr txBox="1">
+            <a:spLocks/>
+          </p:cNvSpPr>
+          <p:nvPr/>
+        </p:nvSpPr>
+        <p:spPr>
+          <a:xfrm>
+            <a:off x="11231765" y="5261811"/>
+            <a:ext cx="697676" cy="613612"/>
+          </a:xfrm>
+          <a:prstGeom prst="rect">
+            <a:avLst/>
+          </a:prstGeom>
+        </p:spPr>
+        <p:txBody>
+          <a:bodyPr vert="horz" lIns="91440" tIns="45720" rIns="91440" bIns="45720" rtlCol="0" anchor="t">
+            <a:noAutofit/>
+          </a:bodyPr>
+          <a:lstStyle>
+            <a:lvl1pPr algn="l" defTabSz="457200" rtl="0" eaLnBrk="1" latinLnBrk="0" hangingPunct="1">
+              <a:spcBef>
+                <a:spcPct val="0"/>
+              </a:spcBef>
+              <a:buNone/>
+              <a:defRPr sz="4200" b="0" i="0" kern="1200">
+                <a:solidFill>
+                  <a:schemeClr val="tx2"/>
+                </a:solidFill>
+                <a:latin typeface="+mj-lt"/>
+                <a:ea typeface="+mj-ea"/>
+                <a:cs typeface="+mj-cs"/>
+              </a:defRPr>
+            </a:lvl1pPr>
+            <a:lvl2pPr eaLnBrk="1" hangingPunct="1">
+              <a:defRPr>
+                <a:solidFill>
+                  <a:schemeClr val="tx2"/>
+                </a:solidFill>
+              </a:defRPr>
+            </a:lvl2pPr>
+            <a:lvl3pPr eaLnBrk="1" hangingPunct="1">
+              <a:defRPr>
+                <a:solidFill>
+                  <a:schemeClr val="tx2"/>
+                </a:solidFill>
+              </a:defRPr>
+            </a:lvl3pPr>
+            <a:lvl4pPr eaLnBrk="1" hangingPunct="1">
+              <a:defRPr>
+                <a:solidFill>
+                  <a:schemeClr val="tx2"/>
+                </a:solidFill>
+              </a:defRPr>
+            </a:lvl4pPr>
+            <a:lvl5pPr eaLnBrk="1" hangingPunct="1">
+              <a:defRPr>
+                <a:solidFill>
+                  <a:schemeClr val="tx2"/>
+                </a:solidFill>
+              </a:defRPr>
+            </a:lvl5pPr>
+            <a:lvl6pPr eaLnBrk="1" hangingPunct="1">
+              <a:defRPr>
+                <a:solidFill>
+                  <a:schemeClr val="tx2"/>
+                </a:solidFill>
+              </a:defRPr>
+            </a:lvl6pPr>
+            <a:lvl7pPr eaLnBrk="1" hangingPunct="1">
+              <a:defRPr>
+                <a:solidFill>
+                  <a:schemeClr val="tx2"/>
+                </a:solidFill>
+              </a:defRPr>
+            </a:lvl7pPr>
+            <a:lvl8pPr eaLnBrk="1" hangingPunct="1">
+              <a:defRPr>
+                <a:solidFill>
+                  <a:schemeClr val="tx2"/>
+                </a:solidFill>
+              </a:defRPr>
+            </a:lvl8pPr>
+            <a:lvl9pPr eaLnBrk="1" hangingPunct="1">
+              <a:defRPr>
+                <a:solidFill>
+                  <a:schemeClr val="tx2"/>
+                </a:solidFill>
+              </a:defRPr>
+            </a:lvl9pPr>
+          </a:lstStyle>
+          <a:p>
+            <a:pPr algn="ctr"/>
+            <a:r>
+              <a:rPr lang="es-PE" sz="3600" b="1" dirty="0" smtClean="0"/>
+              <a:t>IV</a:t>
+            </a:r>
+            <a:endParaRPr lang="es-PE" sz="3600" b="1" dirty="0" smtClean="0"/>
+          </a:p>
+          <a:p>
+            <a:pPr algn="ctr"/>
+            <a:r>
+              <a:rPr lang="es-PE" sz="3600" b="1" dirty="0" smtClean="0"/>
+              <a:t> </a:t>
+            </a:r>
+          </a:p>
+        </p:txBody>
+      </p:sp>
+      <p:pic>
+        <p:nvPicPr>
+          <p:cNvPr id="7" name="image01.gif"/>
+          <p:cNvPicPr/>
+          <p:nvPr/>
+        </p:nvPicPr>
+        <p:blipFill>
+          <a:blip r:embed="rId2"/>
+          <a:srcRect/>
+          <a:stretch>
+            <a:fillRect/>
+          </a:stretch>
+        </p:blipFill>
+        <p:spPr>
+          <a:xfrm>
+            <a:off x="10307555" y="438651"/>
+            <a:ext cx="1009650" cy="1200150"/>
+          </a:xfrm>
+          <a:prstGeom prst="rect">
+            <a:avLst/>
+          </a:prstGeom>
+          <a:ln/>
+        </p:spPr>
+      </p:pic>
+      <p:pic>
+        <p:nvPicPr>
+          <p:cNvPr id="8" name="7 Imagen"/>
+          <p:cNvPicPr/>
+          <p:nvPr/>
+        </p:nvPicPr>
+        <p:blipFill rotWithShape="1">
+          <a:blip r:embed="rId3">
+            <a:extLst>
+              <a:ext uri="{28A0092B-C50C-407E-A947-70E740481C1C}">
+                <a14:useLocalDpi xmlns:a14="http://schemas.microsoft.com/office/drawing/2010/main" val="0"/>
+              </a:ext>
+            </a:extLst>
+          </a:blip>
+          <a:srcRect l="7994" t="5645" r="6467" b="4320"/>
+          <a:stretch/>
+        </p:blipFill>
+        <p:spPr bwMode="auto">
+          <a:xfrm>
+            <a:off x="1944424" y="1303440"/>
+            <a:ext cx="7735614" cy="5034298"/>
+          </a:xfrm>
+          <a:prstGeom prst="rect">
+            <a:avLst/>
+          </a:prstGeom>
+          <a:ln w="19050">
+            <a:solidFill>
+              <a:schemeClr val="tx1">
+                <a:lumMod val="95000"/>
+                <a:lumOff val="5000"/>
+              </a:schemeClr>
+            </a:solidFill>
+          </a:ln>
+          <a:extLst>
+            <a:ext uri="{53640926-AAD7-44D8-BBD7-CCE9431645EC}">
+              <a14:shadowObscured xmlns:a14="http://schemas.microsoft.com/office/drawing/2010/main"/>
+            </a:ext>
+          </a:extLst>
+        </p:spPr>
+      </p:pic>
+      <p:sp>
+        <p:nvSpPr>
+          <p:cNvPr id="9" name="Título 1"/>
+          <p:cNvSpPr>
+            <a:spLocks noGrp="1"/>
+          </p:cNvSpPr>
+          <p:nvPr>
+            <p:ph type="title"/>
+          </p:nvPr>
+        </p:nvSpPr>
+        <p:spPr>
+          <a:xfrm>
+            <a:off x="646111" y="452718"/>
+            <a:ext cx="9404723" cy="1400530"/>
+          </a:xfrm>
+        </p:spPr>
+        <p:txBody>
+          <a:bodyPr/>
+          <a:lstStyle/>
+          <a:p>
+            <a:r>
+              <a:rPr lang="es-PE" dirty="0" smtClean="0"/>
+              <a:t>¿Cómo trabaja </a:t>
+            </a:r>
+            <a:r>
+              <a:rPr lang="es-PE" dirty="0" err="1" smtClean="0"/>
+              <a:t>Scrum</a:t>
+            </a:r>
+            <a:r>
+              <a:rPr lang="es-PE" dirty="0" smtClean="0"/>
+              <a:t>?</a:t>
+            </a:r>
+            <a:endParaRPr lang="es-PE" dirty="0"/>
+          </a:p>
+        </p:txBody>
+      </p:sp>
+      <p:sp>
+        <p:nvSpPr>
+          <p:cNvPr id="10" name="9 Elipse"/>
+          <p:cNvSpPr/>
+          <p:nvPr/>
+        </p:nvSpPr>
+        <p:spPr>
+          <a:xfrm>
+            <a:off x="4960883" y="1765738"/>
+            <a:ext cx="1702676" cy="1091526"/>
+          </a:xfrm>
+          <a:prstGeom prst="ellipse">
+            <a:avLst/>
+          </a:prstGeom>
+          <a:noFill/>
+          <a:ln w="38100">
+            <a:solidFill>
+              <a:srgbClr val="C00000"/>
+            </a:solidFill>
+          </a:ln>
+        </p:spPr>
+        <p:style>
+          <a:lnRef idx="2">
+            <a:schemeClr val="accent1">
+              <a:shade val="50000"/>
+            </a:schemeClr>
+          </a:lnRef>
+          <a:fillRef idx="1">
+            <a:schemeClr val="accent1"/>
+          </a:fillRef>
+          <a:effectRef idx="0">
+            <a:schemeClr val="accent1"/>
+          </a:effectRef>
+          <a:fontRef idx="minor">
+            <a:schemeClr val="lt1"/>
+          </a:fontRef>
+        </p:style>
+        <p:txBody>
+          <a:bodyPr rtlCol="0" anchor="ctr"/>
+          <a:lstStyle/>
+          <a:p>
+            <a:pPr algn="ctr"/>
+            <a:endParaRPr lang="es-PE"/>
+          </a:p>
+        </p:txBody>
+      </p:sp>
+      <p:cxnSp>
+        <p:nvCxnSpPr>
+          <p:cNvPr id="12" name="11 Conector recto"/>
+          <p:cNvCxnSpPr/>
+          <p:nvPr/>
+        </p:nvCxnSpPr>
+        <p:spPr>
+          <a:xfrm>
+            <a:off x="5244661" y="1818288"/>
+            <a:ext cx="1201077" cy="931676"/>
+          </a:xfrm>
+          <a:prstGeom prst="line">
+            <a:avLst/>
+          </a:prstGeom>
+          <a:ln w="57150">
+            <a:solidFill>
+              <a:srgbClr val="C00000"/>
+            </a:solidFill>
+          </a:ln>
+        </p:spPr>
+        <p:style>
+          <a:lnRef idx="1">
+            <a:schemeClr val="accent1"/>
+          </a:lnRef>
+          <a:fillRef idx="0">
+            <a:schemeClr val="accent1"/>
+          </a:fillRef>
+          <a:effectRef idx="0">
+            <a:schemeClr val="accent1"/>
+          </a:effectRef>
+          <a:fontRef idx="minor">
+            <a:schemeClr val="tx1"/>
+          </a:fontRef>
+        </p:style>
+      </p:cxnSp>
+      <p:sp>
+        <p:nvSpPr>
+          <p:cNvPr id="14" name="13 Elipse"/>
+          <p:cNvSpPr/>
+          <p:nvPr/>
+        </p:nvSpPr>
+        <p:spPr>
+          <a:xfrm>
+            <a:off x="8450317" y="4055446"/>
+            <a:ext cx="1082566" cy="747784"/>
+          </a:xfrm>
+          <a:prstGeom prst="ellipse">
+            <a:avLst/>
+          </a:prstGeom>
+          <a:noFill/>
+          <a:ln w="38100">
+            <a:solidFill>
+              <a:srgbClr val="C00000"/>
+            </a:solidFill>
+          </a:ln>
+        </p:spPr>
+        <p:style>
+          <a:lnRef idx="2">
+            <a:schemeClr val="accent1">
+              <a:shade val="50000"/>
+            </a:schemeClr>
+          </a:lnRef>
+          <a:fillRef idx="1">
+            <a:schemeClr val="accent1"/>
+          </a:fillRef>
+          <a:effectRef idx="0">
+            <a:schemeClr val="accent1"/>
+          </a:effectRef>
+          <a:fontRef idx="minor">
+            <a:schemeClr val="lt1"/>
+          </a:fontRef>
+        </p:style>
+        <p:txBody>
+          <a:bodyPr rtlCol="0" anchor="ctr"/>
+          <a:lstStyle/>
+          <a:p>
+            <a:pPr algn="ctr"/>
+            <a:endParaRPr lang="es-PE"/>
+          </a:p>
+        </p:txBody>
+      </p:sp>
+      <p:cxnSp>
+        <p:nvCxnSpPr>
+          <p:cNvPr id="15" name="14 Conector recto"/>
+          <p:cNvCxnSpPr/>
+          <p:nvPr/>
+        </p:nvCxnSpPr>
+        <p:spPr>
+          <a:xfrm>
+            <a:off x="8607972" y="4055446"/>
+            <a:ext cx="984166" cy="747784"/>
+          </a:xfrm>
+          <a:prstGeom prst="line">
+            <a:avLst/>
+          </a:prstGeom>
+          <a:ln w="57150">
+            <a:solidFill>
+              <a:srgbClr val="C00000"/>
+            </a:solidFill>
+          </a:ln>
+        </p:spPr>
+        <p:style>
+          <a:lnRef idx="1">
+            <a:schemeClr val="accent1"/>
+          </a:lnRef>
+          <a:fillRef idx="0">
+            <a:schemeClr val="accent1"/>
+          </a:fillRef>
+          <a:effectRef idx="0">
+            <a:schemeClr val="accent1"/>
+          </a:effectRef>
+          <a:fontRef idx="minor">
+            <a:schemeClr val="tx1"/>
+          </a:fontRef>
+        </p:style>
+      </p:cxnSp>
+      <p:sp>
+        <p:nvSpPr>
+          <p:cNvPr id="17" name="16 Elipse"/>
+          <p:cNvSpPr/>
+          <p:nvPr/>
+        </p:nvSpPr>
+        <p:spPr>
+          <a:xfrm>
+            <a:off x="2443655" y="5022853"/>
+            <a:ext cx="4966138" cy="1230801"/>
+          </a:xfrm>
+          <a:prstGeom prst="ellipse">
+            <a:avLst/>
+          </a:prstGeom>
+          <a:noFill/>
+          <a:ln w="38100">
+            <a:solidFill>
+              <a:srgbClr val="92D050"/>
+            </a:solidFill>
+          </a:ln>
+        </p:spPr>
+        <p:style>
+          <a:lnRef idx="2">
+            <a:schemeClr val="accent1">
+              <a:shade val="50000"/>
+            </a:schemeClr>
+          </a:lnRef>
+          <a:fillRef idx="1">
+            <a:schemeClr val="accent1"/>
+          </a:fillRef>
+          <a:effectRef idx="0">
+            <a:schemeClr val="accent1"/>
+          </a:effectRef>
+          <a:fontRef idx="minor">
+            <a:schemeClr val="lt1"/>
+          </a:fontRef>
+        </p:style>
+        <p:txBody>
+          <a:bodyPr rtlCol="0" anchor="ctr"/>
+          <a:lstStyle/>
+          <a:p>
+            <a:pPr algn="ctr"/>
+            <a:endParaRPr lang="es-PE"/>
+          </a:p>
+        </p:txBody>
+      </p:sp>
+    </p:spTree>
+    <p:extLst>
+      <p:ext uri="{BB962C8B-B14F-4D97-AF65-F5344CB8AC3E}">
+        <p14:creationId xmlns:p14="http://schemas.microsoft.com/office/powerpoint/2010/main" val="1089981786"/>
+      </p:ext>
+    </p:extLst>
+  </p:cSld>
+  <p:clrMapOvr>
+    <a:masterClrMapping/>
+  </p:clrMapOvr>
+</p:sld>
+</file>
+
+<file path=ppt/slides/slide25.xml><?xml version="1.0" encoding="utf-8"?>
+<p:sld xmlns:a="http://schemas.openxmlformats.org/drawingml/2006/main" xmlns:r="http://schemas.openxmlformats.org/officeDocument/2006/relationships" xmlns:p="http://schemas.openxmlformats.org/presentationml/2006/main">
+  <p:cSld>
+    <p:spTree>
+      <p:nvGrpSpPr>
+        <p:cNvPr id="1" name=""/>
+        <p:cNvGrpSpPr/>
+        <p:nvPr/>
+      </p:nvGrpSpPr>
+      <p:grpSpPr>
+        <a:xfrm>
+          <a:off x="0" y="0"/>
+          <a:ext cx="0" cy="0"/>
+          <a:chOff x="0" y="0"/>
+          <a:chExt cx="0" cy="0"/>
+        </a:xfrm>
+      </p:grpSpPr>
+      <p:sp>
+        <p:nvSpPr>
+          <p:cNvPr id="5" name="Título 1"/>
+          <p:cNvSpPr txBox="1">
+            <a:spLocks/>
+          </p:cNvSpPr>
+          <p:nvPr/>
+        </p:nvSpPr>
+        <p:spPr>
+          <a:xfrm>
+            <a:off x="11370260" y="452718"/>
+            <a:ext cx="420687" cy="4809093"/>
+          </a:xfrm>
+          <a:prstGeom prst="rect">
+            <a:avLst/>
+          </a:prstGeom>
+        </p:spPr>
+        <p:txBody>
+          <a:bodyPr vert="horz" lIns="91440" tIns="45720" rIns="91440" bIns="45720" rtlCol="0" anchor="t">
+            <a:noAutofit/>
+          </a:bodyPr>
+          <a:lstStyle>
+            <a:lvl1pPr algn="l" defTabSz="457200" rtl="0" eaLnBrk="1" latinLnBrk="0" hangingPunct="1">
+              <a:spcBef>
+                <a:spcPct val="0"/>
+              </a:spcBef>
+              <a:buNone/>
+              <a:defRPr sz="4200" b="0" i="0" kern="1200">
+                <a:solidFill>
+                  <a:schemeClr val="tx2"/>
+                </a:solidFill>
+                <a:latin typeface="+mj-lt"/>
+                <a:ea typeface="+mj-ea"/>
+                <a:cs typeface="+mj-cs"/>
+              </a:defRPr>
+            </a:lvl1pPr>
+            <a:lvl2pPr eaLnBrk="1" hangingPunct="1">
+              <a:defRPr>
+                <a:solidFill>
+                  <a:schemeClr val="tx2"/>
+                </a:solidFill>
+              </a:defRPr>
+            </a:lvl2pPr>
+            <a:lvl3pPr eaLnBrk="1" hangingPunct="1">
+              <a:defRPr>
+                <a:solidFill>
+                  <a:schemeClr val="tx2"/>
+                </a:solidFill>
+              </a:defRPr>
+            </a:lvl3pPr>
+            <a:lvl4pPr eaLnBrk="1" hangingPunct="1">
+              <a:defRPr>
+                <a:solidFill>
+                  <a:schemeClr val="tx2"/>
+                </a:solidFill>
+              </a:defRPr>
+            </a:lvl4pPr>
+            <a:lvl5pPr eaLnBrk="1" hangingPunct="1">
+              <a:defRPr>
+                <a:solidFill>
+                  <a:schemeClr val="tx2"/>
+                </a:solidFill>
+              </a:defRPr>
+            </a:lvl5pPr>
+            <a:lvl6pPr eaLnBrk="1" hangingPunct="1">
+              <a:defRPr>
+                <a:solidFill>
+                  <a:schemeClr val="tx2"/>
+                </a:solidFill>
+              </a:defRPr>
+            </a:lvl6pPr>
+            <a:lvl7pPr eaLnBrk="1" hangingPunct="1">
+              <a:defRPr>
+                <a:solidFill>
+                  <a:schemeClr val="tx2"/>
+                </a:solidFill>
+              </a:defRPr>
+            </a:lvl7pPr>
+            <a:lvl8pPr eaLnBrk="1" hangingPunct="1">
+              <a:defRPr>
+                <a:solidFill>
+                  <a:schemeClr val="tx2"/>
+                </a:solidFill>
+              </a:defRPr>
+            </a:lvl8pPr>
+            <a:lvl9pPr eaLnBrk="1" hangingPunct="1">
+              <a:defRPr>
+                <a:solidFill>
+                  <a:schemeClr val="tx2"/>
+                </a:solidFill>
+              </a:defRPr>
+            </a:lvl9pPr>
+          </a:lstStyle>
+          <a:p>
+            <a:pPr algn="ctr"/>
+            <a:r>
+              <a:rPr lang="es-PE" sz="3600" b="1" dirty="0" smtClean="0"/>
+              <a:t>CAPÍTULO</a:t>
+            </a:r>
+          </a:p>
+          <a:p>
+            <a:pPr algn="ctr"/>
+            <a:r>
+              <a:rPr lang="es-PE" sz="3600" b="1" dirty="0" smtClean="0"/>
+              <a:t> </a:t>
+            </a:r>
+          </a:p>
+        </p:txBody>
+      </p:sp>
+      <p:sp>
+        <p:nvSpPr>
+          <p:cNvPr id="6" name="Título 1"/>
+          <p:cNvSpPr txBox="1">
+            <a:spLocks/>
+          </p:cNvSpPr>
+          <p:nvPr/>
+        </p:nvSpPr>
+        <p:spPr>
+          <a:xfrm>
+            <a:off x="11231765" y="5261811"/>
+            <a:ext cx="697676" cy="613612"/>
+          </a:xfrm>
+          <a:prstGeom prst="rect">
+            <a:avLst/>
+          </a:prstGeom>
+        </p:spPr>
+        <p:txBody>
+          <a:bodyPr vert="horz" lIns="91440" tIns="45720" rIns="91440" bIns="45720" rtlCol="0" anchor="t">
+            <a:noAutofit/>
+          </a:bodyPr>
+          <a:lstStyle>
+            <a:lvl1pPr algn="l" defTabSz="457200" rtl="0" eaLnBrk="1" latinLnBrk="0" hangingPunct="1">
+              <a:spcBef>
+                <a:spcPct val="0"/>
+              </a:spcBef>
+              <a:buNone/>
+              <a:defRPr sz="4200" b="0" i="0" kern="1200">
+                <a:solidFill>
+                  <a:schemeClr val="tx2"/>
+                </a:solidFill>
+                <a:latin typeface="+mj-lt"/>
+                <a:ea typeface="+mj-ea"/>
+                <a:cs typeface="+mj-cs"/>
+              </a:defRPr>
+            </a:lvl1pPr>
+            <a:lvl2pPr eaLnBrk="1" hangingPunct="1">
+              <a:defRPr>
+                <a:solidFill>
+                  <a:schemeClr val="tx2"/>
+                </a:solidFill>
+              </a:defRPr>
+            </a:lvl2pPr>
+            <a:lvl3pPr eaLnBrk="1" hangingPunct="1">
+              <a:defRPr>
+                <a:solidFill>
+                  <a:schemeClr val="tx2"/>
+                </a:solidFill>
+              </a:defRPr>
+            </a:lvl3pPr>
+            <a:lvl4pPr eaLnBrk="1" hangingPunct="1">
+              <a:defRPr>
+                <a:solidFill>
+                  <a:schemeClr val="tx2"/>
+                </a:solidFill>
+              </a:defRPr>
+            </a:lvl4pPr>
+            <a:lvl5pPr eaLnBrk="1" hangingPunct="1">
+              <a:defRPr>
+                <a:solidFill>
+                  <a:schemeClr val="tx2"/>
+                </a:solidFill>
+              </a:defRPr>
+            </a:lvl5pPr>
+            <a:lvl6pPr eaLnBrk="1" hangingPunct="1">
+              <a:defRPr>
+                <a:solidFill>
+                  <a:schemeClr val="tx2"/>
+                </a:solidFill>
+              </a:defRPr>
+            </a:lvl6pPr>
+            <a:lvl7pPr eaLnBrk="1" hangingPunct="1">
+              <a:defRPr>
+                <a:solidFill>
+                  <a:schemeClr val="tx2"/>
+                </a:solidFill>
+              </a:defRPr>
+            </a:lvl7pPr>
+            <a:lvl8pPr eaLnBrk="1" hangingPunct="1">
+              <a:defRPr>
+                <a:solidFill>
+                  <a:schemeClr val="tx2"/>
+                </a:solidFill>
+              </a:defRPr>
+            </a:lvl8pPr>
+            <a:lvl9pPr eaLnBrk="1" hangingPunct="1">
+              <a:defRPr>
+                <a:solidFill>
+                  <a:schemeClr val="tx2"/>
+                </a:solidFill>
+              </a:defRPr>
+            </a:lvl9pPr>
+          </a:lstStyle>
+          <a:p>
+            <a:pPr algn="ctr"/>
+            <a:r>
+              <a:rPr lang="es-PE" sz="3600" b="1" dirty="0" smtClean="0"/>
+              <a:t>IV</a:t>
+            </a:r>
+            <a:endParaRPr lang="es-PE" sz="3600" b="1" dirty="0" smtClean="0"/>
+          </a:p>
+          <a:p>
+            <a:pPr algn="ctr"/>
+            <a:r>
+              <a:rPr lang="es-PE" sz="3600" b="1" dirty="0" smtClean="0"/>
+              <a:t> </a:t>
+            </a:r>
+          </a:p>
+        </p:txBody>
+      </p:sp>
+      <p:pic>
+        <p:nvPicPr>
+          <p:cNvPr id="7" name="image01.gif"/>
+          <p:cNvPicPr/>
+          <p:nvPr/>
+        </p:nvPicPr>
+        <p:blipFill>
+          <a:blip r:embed="rId2"/>
+          <a:srcRect/>
+          <a:stretch>
+            <a:fillRect/>
+          </a:stretch>
+        </p:blipFill>
+        <p:spPr>
+          <a:xfrm>
+            <a:off x="10307555" y="438651"/>
+            <a:ext cx="1009650" cy="1200150"/>
+          </a:xfrm>
+          <a:prstGeom prst="rect">
+            <a:avLst/>
+          </a:prstGeom>
+          <a:ln/>
+        </p:spPr>
+      </p:pic>
+      <p:sp>
+        <p:nvSpPr>
+          <p:cNvPr id="9" name="Título 1"/>
+          <p:cNvSpPr>
+            <a:spLocks noGrp="1"/>
+          </p:cNvSpPr>
+          <p:nvPr>
+            <p:ph type="title"/>
+          </p:nvPr>
+        </p:nvSpPr>
+        <p:spPr>
+          <a:xfrm>
+            <a:off x="646111" y="452718"/>
+            <a:ext cx="9404723" cy="1400530"/>
+          </a:xfrm>
+        </p:spPr>
+        <p:txBody>
+          <a:bodyPr/>
+          <a:lstStyle/>
+          <a:p>
+            <a:r>
+              <a:rPr lang="es-PE" dirty="0" smtClean="0"/>
+              <a:t>Porqué </a:t>
+            </a:r>
+            <a:r>
+              <a:rPr lang="es-PE" dirty="0" err="1" smtClean="0"/>
+              <a:t>Scrum</a:t>
+            </a:r>
+            <a:r>
+              <a:rPr lang="es-PE" dirty="0" smtClean="0"/>
+              <a:t> es efectivo en la gestión de proyectos de software</a:t>
+            </a:r>
+            <a:endParaRPr lang="es-PE" dirty="0"/>
+          </a:p>
+        </p:txBody>
+      </p:sp>
+      <p:sp>
+        <p:nvSpPr>
+          <p:cNvPr id="4" name="3 CuadroTexto"/>
+          <p:cNvSpPr txBox="1"/>
+          <p:nvPr/>
+        </p:nvSpPr>
+        <p:spPr>
+          <a:xfrm>
+            <a:off x="819807" y="2774731"/>
+            <a:ext cx="2543503" cy="369332"/>
+          </a:xfrm>
+          <a:prstGeom prst="rect">
+            <a:avLst/>
+          </a:prstGeom>
+          <a:noFill/>
+        </p:spPr>
+        <p:txBody>
+          <a:bodyPr wrap="square" rtlCol="0">
+            <a:spAutoFit/>
+          </a:bodyPr>
+          <a:lstStyle/>
+          <a:p>
+            <a:r>
+              <a:rPr lang="es-PE" dirty="0" err="1" smtClean="0"/>
+              <a:t>adsfasdfasd</a:t>
+            </a:r>
+            <a:endParaRPr lang="es-PE" dirty="0"/>
+          </a:p>
+        </p:txBody>
+      </p:sp>
+      <p:sp>
+        <p:nvSpPr>
+          <p:cNvPr id="10" name="9 CuadroTexto"/>
+          <p:cNvSpPr txBox="1"/>
+          <p:nvPr/>
+        </p:nvSpPr>
+        <p:spPr>
+          <a:xfrm>
+            <a:off x="3704897" y="5690757"/>
+            <a:ext cx="2543503" cy="369332"/>
+          </a:xfrm>
+          <a:prstGeom prst="rect">
+            <a:avLst/>
+          </a:prstGeom>
+          <a:noFill/>
+        </p:spPr>
+        <p:txBody>
+          <a:bodyPr wrap="square" rtlCol="0">
+            <a:spAutoFit/>
+          </a:bodyPr>
+          <a:lstStyle/>
+          <a:p>
+            <a:r>
+              <a:rPr lang="es-PE" dirty="0" err="1" smtClean="0"/>
+              <a:t>adsfasdfasd</a:t>
+            </a:r>
+            <a:endParaRPr lang="es-PE" dirty="0"/>
+          </a:p>
+        </p:txBody>
+      </p:sp>
+      <p:sp>
+        <p:nvSpPr>
+          <p:cNvPr id="11" name="10 CuadroTexto"/>
+          <p:cNvSpPr txBox="1"/>
+          <p:nvPr/>
+        </p:nvSpPr>
+        <p:spPr>
+          <a:xfrm>
+            <a:off x="7073462" y="2774731"/>
+            <a:ext cx="2543503" cy="369332"/>
+          </a:xfrm>
+          <a:prstGeom prst="rect">
+            <a:avLst/>
+          </a:prstGeom>
+          <a:noFill/>
+        </p:spPr>
+        <p:txBody>
+          <a:bodyPr wrap="square" rtlCol="0">
+            <a:spAutoFit/>
+          </a:bodyPr>
+          <a:lstStyle/>
+          <a:p>
+            <a:r>
+              <a:rPr lang="es-PE" dirty="0" err="1" smtClean="0"/>
+              <a:t>adsfasdfasd</a:t>
+            </a:r>
+            <a:endParaRPr lang="es-PE" dirty="0"/>
+          </a:p>
+        </p:txBody>
+      </p:sp>
+    </p:spTree>
+    <p:extLst>
+      <p:ext uri="{BB962C8B-B14F-4D97-AF65-F5344CB8AC3E}">
+        <p14:creationId xmlns:p14="http://schemas.microsoft.com/office/powerpoint/2010/main" val="1610230393"/>
+      </p:ext>
+    </p:extLst>
+  </p:cSld>
+  <p:clrMapOvr>
+    <a:masterClrMapping/>
+  </p:clrMapOvr>
+</p:sld>
+</file>
+
+<file path=ppt/slides/slide26.xml><?xml version="1.0" encoding="utf-8"?>
+<p:sld xmlns:a="http://schemas.openxmlformats.org/drawingml/2006/main" xmlns:r="http://schemas.openxmlformats.org/officeDocument/2006/relationships" xmlns:p="http://schemas.openxmlformats.org/presentationml/2006/main">
+  <p:cSld>
+    <p:spTree>
+      <p:nvGrpSpPr>
+        <p:cNvPr id="1" name=""/>
+        <p:cNvGrpSpPr/>
+        <p:nvPr/>
+      </p:nvGrpSpPr>
+      <p:grpSpPr>
+        <a:xfrm>
+          <a:off x="0" y="0"/>
+          <a:ext cx="0" cy="0"/>
+          <a:chOff x="0" y="0"/>
+          <a:chExt cx="0" cy="0"/>
+        </a:xfrm>
+      </p:grpSpPr>
+      <p:sp>
+        <p:nvSpPr>
           <p:cNvPr id="2" name="Título 1"/>
           <p:cNvSpPr>
             <a:spLocks noGrp="1"/>
@@ -11910,12 +13278,20 @@
               <a:t>Muchos eventos son realizados en la ciudad universitaria de la  San Marcos, ellos forman parte de la </a:t>
             </a:r>
             <a:r>
-              <a:rPr lang="es-PE" sz="2800" dirty="0" err="1" smtClean="0"/>
-              <a:t>itinerancia</a:t>
-            </a:r>
-            <a:r>
               <a:rPr lang="es-PE" sz="2800" dirty="0" smtClean="0"/>
-              <a:t> académica y cultural de las diferentes facultades.</a:t>
+              <a:t>formaci</a:t>
+            </a:r>
+            <a:r>
+              <a:rPr lang="es-PE" sz="2800" dirty="0" smtClean="0"/>
+              <a:t>ón </a:t>
+            </a:r>
+            <a:r>
+              <a:rPr lang="es-PE" sz="2800" dirty="0" smtClean="0"/>
+              <a:t>académica </a:t>
+            </a:r>
+            <a:r>
+              <a:rPr lang="es-PE" sz="2800" dirty="0" smtClean="0"/>
+              <a:t>y cultural de las diferentes facultades.</a:t>
             </a:r>
           </a:p>
           <a:p>
@@ -12139,46 +13515,48 @@
         </p:nvSpPr>
         <p:spPr/>
         <p:txBody>
-          <a:bodyPr/>
+          <a:bodyPr>
+            <a:normAutofit/>
+          </a:bodyPr>
           <a:lstStyle/>
           <a:p>
             <a:r>
-              <a:rPr lang="es-PE" dirty="0"/>
+              <a:rPr lang="es-PE" sz="2200" dirty="0"/>
               <a:t>El objetivo principal es el desarrollo de una aplicación en Android que proporcione solución alternativa al problema de la eficiente difusión de eventos realizados en la ciudad universitaria, aplicando realidad aumentada basada en geolocalización</a:t>
             </a:r>
             <a:r>
-              <a:rPr lang="es-PE" dirty="0" smtClean="0"/>
+              <a:rPr lang="es-PE" sz="2200" dirty="0" smtClean="0"/>
               <a:t>.</a:t>
             </a:r>
           </a:p>
           <a:p>
             <a:r>
-              <a:rPr lang="es-PE" dirty="0" smtClean="0"/>
+              <a:rPr lang="es-PE" sz="2200" dirty="0" smtClean="0"/>
               <a:t>Secundarios:</a:t>
             </a:r>
           </a:p>
           <a:p>
             <a:pPr lvl="1"/>
             <a:r>
-              <a:rPr lang="es-PE" dirty="0" smtClean="0"/>
+              <a:rPr lang="es-PE" sz="2200" dirty="0" smtClean="0"/>
               <a:t>Diseñar e implementar un sistema web centralizado para que las facultades puedan registrar sus eventos.</a:t>
             </a:r>
           </a:p>
           <a:p>
             <a:pPr lvl="1"/>
             <a:r>
-              <a:rPr lang="es-PE" dirty="0" smtClean="0"/>
+              <a:rPr lang="es-PE" sz="2200" dirty="0" smtClean="0"/>
               <a:t>Diseñar e implementar una aplicación móvil en Android que permita </a:t>
             </a:r>
             <a:r>
-              <a:rPr lang="es-PE" dirty="0" err="1" smtClean="0"/>
+              <a:rPr lang="es-PE" sz="2200" dirty="0" err="1" smtClean="0"/>
               <a:t>geolocalizar</a:t>
             </a:r>
             <a:r>
-              <a:rPr lang="es-PE" dirty="0" smtClean="0"/>
+              <a:rPr lang="es-PE" sz="2200" dirty="0" smtClean="0"/>
               <a:t> las facultades y sus eventos.</a:t>
             </a:r>
-            <a:endParaRPr lang="es-PE" dirty="0"/>
+            <a:endParaRPr lang="es-PE" sz="2200" dirty="0"/>
           </a:p>
         </p:txBody>
       </p:sp>
@@ -13767,7 +15145,7 @@
     </a:clrScheme>
     <a:fontScheme name="Ion">
       <a:majorFont>
-        <a:latin typeface="Century Gothic" panose="020B0502020202020204"/>
+        <a:latin typeface="Century Gothic"/>
         <a:ea typeface=""/>
         <a:cs typeface=""/>
         <a:font script="Jpan" typeface="メイリオ"/>
@@ -13802,7 +15180,7 @@
         <a:font script="Geor" typeface="Sylfaen"/>
       </a:majorFont>
       <a:minorFont>
-        <a:latin typeface="Century Gothic" panose="020B0502020202020204"/>
+        <a:latin typeface="Century Gothic"/>
         <a:ea typeface=""/>
         <a:cs typeface=""/>
         <a:font script="Jpan" typeface="メイリオ"/>
@@ -13983,7 +15361,7 @@
   <a:extraClrSchemeLst/>
   <a:extLst>
     <a:ext uri="{05A4C25C-085E-4340-85A3-A5531E510DB2}">
-      <thm15:themeFamily xmlns:thm15="http://schemas.microsoft.com/office/thememl/2012/main" name="Ion" id="{B8441ADB-2E43-4AF7-B97A-BD870242C6A8}" vid="{BACC050B-8757-4460-95D8-E37B46A6B421}"/>
+      <thm15:themeFamily xmlns:thm15="http://schemas.microsoft.com/office/thememl/2012/main" xmlns="" name="Ion" id="{B8441ADB-2E43-4AF7-B97A-BD870242C6A8}" vid="{BACC050B-8757-4460-95D8-E37B46A6B421}"/>
     </a:ext>
   </a:extLst>
 </a:theme>

</xml_diff>

<commit_message>
Se hicieron ediciones finales
</commit_message>
<xml_diff>
--- a/Tesis.pptx
+++ b/Tesis.pptx
@@ -131,7 +131,18 @@
   </p:defaultTextStyle>
   <p:extLst>
     <p:ext uri="{EFAFB233-063F-42B5-8137-9DF3F51BA10A}">
-      <p15:sldGuideLst xmlns:p15="http://schemas.microsoft.com/office/powerpoint/2012/main" xmlns=""/>
+      <p15:sldGuideLst xmlns:p15="http://schemas.microsoft.com/office/powerpoint/2012/main">
+        <p15:guide id="1" orient="horz" pos="2160">
+          <p15:clr>
+            <a:srgbClr val="A4A3A4"/>
+          </p15:clr>
+        </p15:guide>
+        <p15:guide id="2" pos="3840">
+          <p15:clr>
+            <a:srgbClr val="A4A3A4"/>
+          </p15:clr>
+        </p15:guide>
+      </p15:sldGuideLst>
     </p:ext>
   </p:extLst>
 </p:presentation>
@@ -6127,6 +6138,7 @@
           </a:bodyPr>
           <a:lstStyle/>
           <a:p>
+            <a:pPr algn="just"/>
             <a:r>
               <a:rPr lang="es-PE" sz="2400" dirty="0"/>
               <a:t>A pesar de que el término realidad aumentada fue acuñado en la década de los noventa, en 1968 </a:t>
@@ -6146,6 +6158,7 @@
             <a:endParaRPr lang="es-PE" sz="2400" dirty="0"/>
           </a:p>
           <a:p>
+            <a:pPr algn="just"/>
             <a:r>
               <a:rPr lang="es-PE" sz="2400" dirty="0"/>
               <a:t>No fue hasta 1997 en que la realidad aumentada pasó a ser móvil, gracias a los avances tecnológicos. Fue </a:t>
@@ -6580,6 +6593,13 @@
   <p:clrMapOvr>
     <a:masterClrMapping/>
   </p:clrMapOvr>
+  <p:timing>
+    <p:tnLst>
+      <p:par>
+        <p:cTn id="1" dur="indefinite" restart="never" nodeType="tmRoot"/>
+      </p:par>
+    </p:tnLst>
+  </p:timing>
 </p:sld>
 </file>
 
@@ -6646,6 +6666,7 @@
           <a:bodyPr/>
           <a:lstStyle/>
           <a:p>
+            <a:pPr algn="just"/>
             <a:r>
               <a:rPr lang="es-PE" dirty="0"/>
               <a:t>Es un paradigma de programación que encuentra y usa información del entorno. Hay dos visiones principales sobre el concepto de </a:t>
@@ -6812,13 +6833,13 @@
           <p:nvPr>
             <p:extLst>
               <p:ext uri="{D42A27DB-BD31-4B8C-83A1-F6EECF244321}">
-                <p14:modId xmlns:p14="http://schemas.microsoft.com/office/powerpoint/2010/main" val="2595839894"/>
+                <p14:modId xmlns:p14="http://schemas.microsoft.com/office/powerpoint/2010/main" val="2116596652"/>
               </p:ext>
             </p:extLst>
           </p:nvPr>
         </p:nvGraphicFramePr>
         <p:xfrm>
-          <a:off x="3112218" y="3736064"/>
+          <a:off x="3818069" y="3736064"/>
           <a:ext cx="4555908" cy="2375980"/>
         </p:xfrm>
         <a:graphic>
@@ -6845,12 +6866,12 @@
                         </a:spcAft>
                       </a:pPr>
                       <a:r>
-                        <a:rPr lang="es-PE" sz="1100">
+                        <a:rPr lang="es-PE" sz="1100" dirty="0">
                           <a:effectLst/>
                         </a:rPr>
                         <a:t>Aplicación</a:t>
                       </a:r>
-                      <a:endParaRPr lang="es-PE" sz="1100">
+                      <a:endParaRPr lang="es-PE" sz="1100" dirty="0">
                         <a:solidFill>
                           <a:srgbClr val="000000"/>
                         </a:solidFill>
@@ -7033,6 +7054,13 @@
   <p:clrMapOvr>
     <a:masterClrMapping/>
   </p:clrMapOvr>
+  <p:timing>
+    <p:tnLst>
+      <p:par>
+        <p:cTn id="1" dur="indefinite" restart="never" nodeType="tmRoot"/>
+      </p:par>
+    </p:tnLst>
+  </p:timing>
 </p:sld>
 </file>
 
@@ -7099,6 +7127,7 @@
           <a:bodyPr/>
           <a:lstStyle/>
           <a:p>
+            <a:pPr algn="just"/>
             <a:r>
               <a:rPr lang="es-PE" dirty="0"/>
               <a:t>La otra visión principal la tiene </a:t>
@@ -7342,6 +7371,13 @@
   <p:clrMapOvr>
     <a:masterClrMapping/>
   </p:clrMapOvr>
+  <p:timing>
+    <p:tnLst>
+      <p:par>
+        <p:cTn id="1" dur="indefinite" restart="never" nodeType="tmRoot"/>
+      </p:par>
+    </p:tnLst>
+  </p:timing>
 </p:sld>
 </file>
 
@@ -7400,6 +7436,7 @@
           <a:bodyPr/>
           <a:lstStyle/>
           <a:p>
+            <a:pPr algn="just"/>
             <a:r>
               <a:rPr lang="es-PE" dirty="0"/>
               <a:t>IDE es el acrónimo de </a:t>
@@ -7430,6 +7467,7 @@
             </a:r>
           </a:p>
           <a:p>
+            <a:pPr algn="just"/>
             <a:r>
               <a:rPr lang="es-PE" dirty="0"/>
               <a:t>Un IDE es una aplicación que facilita el desarrollo de aplicaciones. En general, un IDE es una interfaz de usuario (GUI) basada en el </a:t>
@@ -7444,6 +7482,7 @@
             </a:r>
           </a:p>
           <a:p>
+            <a:pPr algn="just"/>
             <a:endParaRPr lang="es-PE" dirty="0"/>
           </a:p>
         </p:txBody>
@@ -7629,6 +7668,13 @@
   <p:clrMapOvr>
     <a:masterClrMapping/>
   </p:clrMapOvr>
+  <p:timing>
+    <p:tnLst>
+      <p:par>
+        <p:cTn id="1" dur="indefinite" restart="never" nodeType="tmRoot"/>
+      </p:par>
+    </p:tnLst>
+  </p:timing>
 </p:sld>
 </file>
 
@@ -7690,6 +7736,7 @@
           <a:bodyPr/>
           <a:lstStyle/>
           <a:p>
+            <a:pPr algn="just"/>
             <a:r>
               <a:rPr lang="es-PE" dirty="0"/>
               <a:t>VISION SDK® es una librería de vistas de Realidad Aumentada (RA) para dispositivos Apple® iOS o Google Android OS</a:t>
@@ -7709,6 +7756,7 @@
             <a:endParaRPr lang="es-PE" dirty="0"/>
           </a:p>
           <a:p>
+            <a:pPr algn="just"/>
             <a:endParaRPr lang="es-PE" dirty="0"/>
           </a:p>
         </p:txBody>
@@ -7894,6 +7942,13 @@
   <p:clrMapOvr>
     <a:masterClrMapping/>
   </p:clrMapOvr>
+  <p:timing>
+    <p:tnLst>
+      <p:par>
+        <p:cTn id="1" dur="indefinite" restart="never" nodeType="tmRoot"/>
+      </p:par>
+    </p:tnLst>
+  </p:timing>
 </p:sld>
 </file>
 
@@ -7953,6 +8008,7 @@
           </a:bodyPr>
           <a:lstStyle/>
           <a:p>
+            <a:pPr algn="just"/>
             <a:r>
               <a:rPr lang="es-PE" sz="2400" dirty="0"/>
               <a:t>Se trata de una aplicación realizada por Elías Pardo que, dependiendo de la localización en la que se encuentre el terminal, muestra al usuario los puntos de interés cercanos a él mediante una interfaz gráfica. De esta manera el usuario puede obtener información acerca de los lugares que visita o se encuentra sin la necesidad de consultar una guía, mapa o preguntar a la gente de la localidad. La utilidad principal de la aplicación es servir de guía turística al usuario.</a:t>
@@ -8212,6 +8268,13 @@
   <p:clrMapOvr>
     <a:masterClrMapping/>
   </p:clrMapOvr>
+  <p:timing>
+    <p:tnLst>
+      <p:par>
+        <p:cTn id="1" dur="indefinite" restart="never" nodeType="tmRoot"/>
+      </p:par>
+    </p:tnLst>
+  </p:timing>
 </p:sld>
 </file>
 
@@ -8336,6 +8399,7 @@
           </a:bodyPr>
           <a:lstStyle/>
           <a:p>
+            <a:pPr algn="just"/>
             <a:r>
               <a:rPr lang="es-PE" sz="2400" dirty="0"/>
               <a:t>Esta tesis, desarrollada por Martin </a:t>
@@ -8655,6 +8719,13 @@
   <p:clrMapOvr>
     <a:masterClrMapping/>
   </p:clrMapOvr>
+  <p:timing>
+    <p:tnLst>
+      <p:par>
+        <p:cTn id="1" dur="indefinite" restart="never" nodeType="tmRoot"/>
+      </p:par>
+    </p:tnLst>
+  </p:timing>
 </p:sld>
 </file>
 
@@ -8810,6 +8881,7 @@
           </a:bodyPr>
           <a:lstStyle/>
           <a:p>
+            <a:pPr algn="just"/>
             <a:r>
               <a:rPr lang="es-PE" sz="2200" dirty="0"/>
               <a:t>En esta tesis, elaborada por </a:t>
@@ -9138,6 +9210,13 @@
   <p:clrMapOvr>
     <a:masterClrMapping/>
   </p:clrMapOvr>
+  <p:timing>
+    <p:tnLst>
+      <p:par>
+        <p:cTn id="1" dur="indefinite" restart="never" nodeType="tmRoot"/>
+      </p:par>
+    </p:tnLst>
+  </p:timing>
 </p:sld>
 </file>
 
@@ -9415,7 +9494,6 @@
               <a:rPr lang="es-PE" sz="3600" b="1" dirty="0" smtClean="0"/>
               <a:t>III</a:t>
             </a:r>
-            <a:endParaRPr lang="es-PE" sz="3600" b="1" dirty="0" smtClean="0"/>
           </a:p>
           <a:p>
             <a:pPr algn="ctr"/>
@@ -9489,6 +9567,13 @@
   <p:clrMapOvr>
     <a:masterClrMapping/>
   </p:clrMapOvr>
+  <p:timing>
+    <p:tnLst>
+      <p:par>
+        <p:cTn id="1" dur="indefinite" restart="never" nodeType="tmRoot"/>
+      </p:par>
+    </p:tnLst>
+  </p:timing>
 </p:sld>
 </file>
 
@@ -9557,25 +9642,13 @@
           <a:p>
             <a:r>
               <a:rPr lang="es-PE" sz="3200" dirty="0" smtClean="0"/>
-              <a:t>Capítulo </a:t>
-            </a:r>
+              <a:t>Capítulo II: Marco Teórico</a:t>
+            </a:r>
+          </a:p>
+          <a:p>
             <a:r>
               <a:rPr lang="es-PE" sz="3200" dirty="0" smtClean="0"/>
-              <a:t>II: Marco Teórico</a:t>
-            </a:r>
-          </a:p>
-          <a:p>
-            <a:r>
-              <a:rPr lang="es-PE" sz="3200" dirty="0" smtClean="0"/>
-              <a:t>Capítulo </a:t>
-            </a:r>
-            <a:r>
-              <a:rPr lang="es-PE" sz="3200" dirty="0" smtClean="0"/>
-              <a:t>III: Estado del </a:t>
-            </a:r>
-            <a:r>
-              <a:rPr lang="es-PE" sz="3200" dirty="0" smtClean="0"/>
-              <a:t>Arte</a:t>
+              <a:t>Capítulo III: Estado del Arte</a:t>
             </a:r>
           </a:p>
           <a:p>
@@ -11818,6 +11891,7 @@
           </a:bodyPr>
           <a:lstStyle/>
           <a:p>
+            <a:pPr algn="just"/>
             <a:r>
               <a:rPr lang="es-PE" sz="2200" dirty="0" smtClean="0"/>
               <a:t>Jeff </a:t>
@@ -11836,6 +11910,7 @@
             </a:r>
           </a:p>
           <a:p>
+            <a:pPr algn="just"/>
             <a:r>
               <a:rPr lang="es-PE" sz="2400" dirty="0"/>
               <a:t>Ken </a:t>
@@ -11875,17 +11950,14 @@
             <a:endParaRPr lang="es-PE" sz="2200" dirty="0" smtClean="0"/>
           </a:p>
           <a:p>
+            <a:pPr algn="just"/>
             <a:r>
               <a:rPr lang="es-PE" sz="2200" dirty="0" err="1" smtClean="0"/>
               <a:t>Scrum</a:t>
             </a:r>
             <a:r>
               <a:rPr lang="es-PE" sz="2200" dirty="0" smtClean="0"/>
-              <a:t> nace com</a:t>
-            </a:r>
-            <a:r>
-              <a:rPr lang="es-PE" sz="2200" dirty="0" smtClean="0"/>
-              <a:t>o evolución de ambos intentos para lograr una metodología que permita un desarrollo ágil, en la que el cliente tenga mayor participación y el equipo sea multidisciplinario.</a:t>
+              <a:t> nace como evolución de ambos intentos para lograr una metodología que permita un desarrollo ágil, en la que el cliente tenga mayor participación y el equipo sea multidisciplinario.</a:t>
             </a:r>
           </a:p>
         </p:txBody>
@@ -12098,7 +12170,6 @@
               <a:rPr lang="es-PE" sz="3600" b="1" dirty="0" smtClean="0"/>
               <a:t>IV</a:t>
             </a:r>
-            <a:endParaRPr lang="es-PE" sz="3600" b="1" dirty="0" smtClean="0"/>
           </a:p>
           <a:p>
             <a:pPr algn="ctr"/>
@@ -12155,11 +12226,7 @@
           <a:p>
             <a:r>
               <a:rPr lang="es-PE" dirty="0" smtClean="0"/>
-              <a:t>Metodolog</a:t>
-            </a:r>
-            <a:r>
-              <a:rPr lang="es-PE" dirty="0" smtClean="0"/>
-              <a:t>ía</a:t>
+              <a:t>Metodología</a:t>
             </a:r>
             <a:endParaRPr lang="es-PE" dirty="0"/>
           </a:p>
@@ -12403,7 +12470,6 @@
               <a:rPr lang="es-PE" sz="3600" b="1" dirty="0" smtClean="0"/>
               <a:t>IV</a:t>
             </a:r>
-            <a:endParaRPr lang="es-PE" sz="3600" b="1" dirty="0" smtClean="0"/>
           </a:p>
           <a:p>
             <a:pPr algn="ctr"/>
@@ -12960,7 +13026,6 @@
               <a:rPr lang="es-PE" sz="3600" b="1" dirty="0" smtClean="0"/>
               <a:t>IV</a:t>
             </a:r>
-            <a:endParaRPr lang="es-PE" sz="3600" b="1" dirty="0" smtClean="0"/>
           </a:p>
           <a:p>
             <a:pPr algn="ctr"/>
@@ -13275,23 +13340,15 @@
           <a:p>
             <a:r>
               <a:rPr lang="es-PE" sz="2800" dirty="0" smtClean="0"/>
-              <a:t>Muchos eventos son realizados en la ciudad universitaria de la  San Marcos, ellos forman parte de la </a:t>
+              <a:t>Muchos eventos son realizados en la ciudad universitaria de la  San Marcos, ellos forman parte de </a:t>
             </a:r>
             <a:r>
               <a:rPr lang="es-PE" sz="2800" dirty="0" smtClean="0"/>
-              <a:t>formaci</a:t>
+              <a:t>las actividades </a:t>
             </a:r>
             <a:r>
               <a:rPr lang="es-PE" sz="2800" dirty="0" smtClean="0"/>
-              <a:t>ón </a:t>
-            </a:r>
-            <a:r>
-              <a:rPr lang="es-PE" sz="2800" dirty="0" smtClean="0"/>
-              <a:t>académica </a:t>
-            </a:r>
-            <a:r>
-              <a:rPr lang="es-PE" sz="2800" dirty="0" smtClean="0"/>
-              <a:t>y cultural de las diferentes facultades.</a:t>
+              <a:t>académica y cultural de las diferentes facultades.</a:t>
             </a:r>
           </a:p>
           <a:p>
@@ -13771,6 +13828,7 @@
           </a:bodyPr>
           <a:lstStyle/>
           <a:p>
+            <a:pPr algn="just"/>
             <a:r>
               <a:rPr lang="es-PE" sz="2600" dirty="0"/>
               <a:t>En la actualidad, el poder tener un dispositivo inteligente sea teléfono o </a:t>
@@ -14018,13 +14076,18 @@
           </a:bodyPr>
           <a:lstStyle/>
           <a:p>
+            <a:pPr algn="just"/>
             <a:r>
               <a:rPr lang="es-PE" sz="2400" dirty="0"/>
               <a:t>La aplicación sólo permitirá visualizar puntos de interés </a:t>
             </a:r>
             <a:r>
+              <a:rPr lang="es-PE" sz="2400" dirty="0" err="1" smtClean="0"/>
+              <a:t>geolocalizados</a:t>
+            </a:r>
+            <a:r>
               <a:rPr lang="es-PE" sz="2400" dirty="0" smtClean="0"/>
-              <a:t>geo localizados </a:t>
+              <a:t> </a:t>
             </a:r>
             <a:r>
               <a:rPr lang="es-PE" sz="2400" dirty="0"/>
@@ -14037,12 +14100,14 @@
             <a:endParaRPr lang="es-PE" sz="2400" dirty="0"/>
           </a:p>
           <a:p>
+            <a:pPr algn="just"/>
             <a:r>
               <a:rPr lang="es-PE" sz="2400" dirty="0"/>
               <a:t>Tener disponible una conexión a internet para poder recibir la información actualizada del registro de eventos.</a:t>
             </a:r>
           </a:p>
           <a:p>
+            <a:pPr algn="just"/>
             <a:r>
               <a:rPr lang="es-PE" sz="2400" dirty="0"/>
               <a:t>El desarrollo de esta aplicación está dirigida hacia la plataforma de teléfonos inteligentes o </a:t>
@@ -14069,7 +14134,11 @@
             </a:r>
             <a:r>
               <a:rPr lang="es-PE" sz="2400" dirty="0"/>
-              <a:t>, desde la versión 2.2 y </a:t>
+              <a:t>, desde la versión </a:t>
+            </a:r>
+            <a:r>
+              <a:rPr lang="es-PE" sz="2400" dirty="0" smtClean="0"/>
+              <a:t>2.3.3 y </a:t>
             </a:r>
             <a:r>
               <a:rPr lang="es-PE" sz="2400" dirty="0" smtClean="0"/>
@@ -14458,7 +14527,7 @@
         <p:spPr>
           <a:xfrm>
             <a:off x="5348472" y="1386705"/>
-            <a:ext cx="3071608" cy="1200329"/>
+            <a:ext cx="3071608" cy="1477328"/>
           </a:xfrm>
           <a:prstGeom prst="rect">
             <a:avLst/>
@@ -14470,49 +14539,52 @@
           </a:bodyPr>
           <a:lstStyle/>
           <a:p>
+            <a:pPr algn="just"/>
             <a:r>
               <a:rPr lang="es-PE" dirty="0" smtClean="0">
-                <a:latin typeface="Arial" panose="020B0604020202020204" pitchFamily="34" charset="0"/>
+                <a:latin typeface="+mj-lt"/>
                 <a:ea typeface="Arial" panose="020B0604020202020204" pitchFamily="34" charset="0"/>
               </a:rPr>
               <a:t>Android Inc., fundada </a:t>
             </a:r>
             <a:r>
               <a:rPr lang="es-PE" dirty="0">
-                <a:latin typeface="Arial" panose="020B0604020202020204" pitchFamily="34" charset="0"/>
+                <a:latin typeface="+mj-lt"/>
                 <a:ea typeface="Arial" panose="020B0604020202020204" pitchFamily="34" charset="0"/>
               </a:rPr>
               <a:t>por Andy </a:t>
             </a:r>
             <a:r>
               <a:rPr lang="es-PE" dirty="0" err="1">
-                <a:latin typeface="Arial" panose="020B0604020202020204" pitchFamily="34" charset="0"/>
+                <a:latin typeface="+mj-lt"/>
                 <a:ea typeface="Arial" panose="020B0604020202020204" pitchFamily="34" charset="0"/>
               </a:rPr>
               <a:t>Rubin</a:t>
             </a:r>
             <a:r>
               <a:rPr lang="es-PE" dirty="0">
-                <a:latin typeface="Arial" panose="020B0604020202020204" pitchFamily="34" charset="0"/>
+                <a:latin typeface="+mj-lt"/>
                 <a:ea typeface="Arial" panose="020B0604020202020204" pitchFamily="34" charset="0"/>
               </a:rPr>
               <a:t>, Chris White, Nick Sears, y </a:t>
             </a:r>
             <a:r>
               <a:rPr lang="es-PE" dirty="0" err="1">
-                <a:latin typeface="Arial" panose="020B0604020202020204" pitchFamily="34" charset="0"/>
+                <a:latin typeface="+mj-lt"/>
                 <a:ea typeface="Arial" panose="020B0604020202020204" pitchFamily="34" charset="0"/>
               </a:rPr>
               <a:t>Rich</a:t>
             </a:r>
             <a:r>
               <a:rPr lang="es-PE" dirty="0">
-                <a:latin typeface="Arial" panose="020B0604020202020204" pitchFamily="34" charset="0"/>
+                <a:latin typeface="+mj-lt"/>
                 <a:ea typeface="Arial" panose="020B0604020202020204" pitchFamily="34" charset="0"/>
               </a:rPr>
               <a:t> Minero en octubre de 2003. </a:t>
             </a:r>
-            <a:endParaRPr lang="es-PE" dirty="0"/>
+            <a:endParaRPr lang="es-PE" dirty="0">
+              <a:latin typeface="+mj-lt"/>
+            </a:endParaRPr>
           </a:p>
         </p:txBody>
       </p:sp>
@@ -14537,77 +14609,80 @@
           </a:bodyPr>
           <a:lstStyle/>
           <a:p>
+            <a:pPr algn="just"/>
             <a:r>
               <a:rPr lang="es-PE" dirty="0">
-                <a:latin typeface="Arial" panose="020B0604020202020204" pitchFamily="34" charset="0"/>
+                <a:latin typeface="+mj-lt"/>
                 <a:ea typeface="Arial" panose="020B0604020202020204" pitchFamily="34" charset="0"/>
               </a:rPr>
               <a:t>En noviembre de 2007, la </a:t>
             </a:r>
             <a:r>
               <a:rPr lang="es-PE" i="1" dirty="0">
-                <a:latin typeface="Arial" panose="020B0604020202020204" pitchFamily="34" charset="0"/>
+                <a:latin typeface="+mj-lt"/>
                 <a:ea typeface="Arial" panose="020B0604020202020204" pitchFamily="34" charset="0"/>
               </a:rPr>
               <a:t>Open </a:t>
             </a:r>
             <a:r>
               <a:rPr lang="es-PE" i="1" dirty="0" err="1">
-                <a:latin typeface="Arial" panose="020B0604020202020204" pitchFamily="34" charset="0"/>
+                <a:latin typeface="+mj-lt"/>
                 <a:ea typeface="Arial" panose="020B0604020202020204" pitchFamily="34" charset="0"/>
               </a:rPr>
               <a:t>Handset</a:t>
             </a:r>
             <a:r>
               <a:rPr lang="es-PE" i="1" dirty="0">
-                <a:latin typeface="Arial" panose="020B0604020202020204" pitchFamily="34" charset="0"/>
+                <a:latin typeface="+mj-lt"/>
                 <a:ea typeface="Arial" panose="020B0604020202020204" pitchFamily="34" charset="0"/>
               </a:rPr>
               <a:t> Alliance</a:t>
             </a:r>
             <a:r>
               <a:rPr lang="es-PE" dirty="0">
-                <a:latin typeface="Arial" panose="020B0604020202020204" pitchFamily="34" charset="0"/>
+                <a:latin typeface="+mj-lt"/>
                 <a:ea typeface="Arial" panose="020B0604020202020204" pitchFamily="34" charset="0"/>
               </a:rPr>
               <a:t> (OHA) fue anunciada. </a:t>
             </a:r>
             <a:r>
               <a:rPr lang="es-PE" dirty="0" smtClean="0">
-                <a:latin typeface="Arial" panose="020B0604020202020204" pitchFamily="34" charset="0"/>
+                <a:latin typeface="+mj-lt"/>
                 <a:ea typeface="Arial" panose="020B0604020202020204" pitchFamily="34" charset="0"/>
               </a:rPr>
               <a:t>Incluían </a:t>
             </a:r>
             <a:r>
               <a:rPr lang="es-PE" dirty="0">
-                <a:latin typeface="Arial" panose="020B0604020202020204" pitchFamily="34" charset="0"/>
+                <a:latin typeface="+mj-lt"/>
                 <a:ea typeface="Arial" panose="020B0604020202020204" pitchFamily="34" charset="0"/>
               </a:rPr>
               <a:t>34 miembros fundadores encabezados por </a:t>
             </a:r>
             <a:r>
               <a:rPr lang="es-PE" dirty="0" smtClean="0">
-                <a:latin typeface="Arial" panose="020B0604020202020204" pitchFamily="34" charset="0"/>
+                <a:latin typeface="+mj-lt"/>
                 <a:ea typeface="Arial" panose="020B0604020202020204" pitchFamily="34" charset="0"/>
               </a:rPr>
               <a:t>Google. Se </a:t>
             </a:r>
             <a:r>
               <a:rPr lang="es-PE" dirty="0">
-                <a:latin typeface="Arial" panose="020B0604020202020204" pitchFamily="34" charset="0"/>
+                <a:latin typeface="+mj-lt"/>
                 <a:ea typeface="Arial" panose="020B0604020202020204" pitchFamily="34" charset="0"/>
               </a:rPr>
               <a:t>pretende acelerar la innovación de la plataforma móvil y ofrecer a los consumidores una experiencia móvil más completa, menos costosa, y mejor. La OHA ha crecido desde entonces a 84 miembros</a:t>
             </a:r>
             <a:r>
               <a:rPr lang="es-PE" dirty="0" smtClean="0">
-                <a:latin typeface="Arial" panose="020B0604020202020204" pitchFamily="34" charset="0"/>
+                <a:latin typeface="+mj-lt"/>
                 <a:ea typeface="Arial" panose="020B0604020202020204" pitchFamily="34" charset="0"/>
               </a:rPr>
               <a:t>.</a:t>
             </a:r>
-            <a:endParaRPr lang="es-PE" dirty="0"/>
+            <a:endParaRPr lang="es-PE" dirty="0">
+              <a:latin typeface="+mj-lt"/>
+            </a:endParaRPr>
           </a:p>
         </p:txBody>
       </p:sp>
@@ -15361,7 +15436,7 @@
   <a:extraClrSchemeLst/>
   <a:extLst>
     <a:ext uri="{05A4C25C-085E-4340-85A3-A5531E510DB2}">
-      <thm15:themeFamily xmlns:thm15="http://schemas.microsoft.com/office/thememl/2012/main" xmlns="" name="Ion" id="{B8441ADB-2E43-4AF7-B97A-BD870242C6A8}" vid="{BACC050B-8757-4460-95D8-E37B46A6B421}"/>
+      <thm15:themeFamily xmlns:thm15="http://schemas.microsoft.com/office/thememl/2012/main" name="Ion" id="{B8441ADB-2E43-4AF7-B97A-BD870242C6A8}" vid="{BACC050B-8757-4460-95D8-E37B46A6B421}"/>
     </a:ext>
   </a:extLst>
 </a:theme>

</xml_diff>